<commit_message>
UI Scans, Presentation 99%
</commit_message>
<xml_diff>
--- a/docs/CS1/task03/Design Thinking/Präsentation Task3.pptx
+++ b/docs/CS1/task03/Design Thinking/Präsentation Task3.pptx
@@ -5,7 +5,7 @@
     <p:sldMasterId id="2147483870" r:id="rId1"/>
   </p:sldMasterIdLst>
   <p:notesMasterIdLst>
-    <p:notesMasterId r:id="rId12"/>
+    <p:notesMasterId r:id="rId14"/>
   </p:notesMasterIdLst>
   <p:sldIdLst>
     <p:sldId id="256" r:id="rId2"/>
@@ -15,9 +15,11 @@
     <p:sldId id="260" r:id="rId6"/>
     <p:sldId id="261" r:id="rId7"/>
     <p:sldId id="262" r:id="rId8"/>
-    <p:sldId id="265" r:id="rId9"/>
-    <p:sldId id="263" r:id="rId10"/>
-    <p:sldId id="264" r:id="rId11"/>
+    <p:sldId id="266" r:id="rId9"/>
+    <p:sldId id="267" r:id="rId10"/>
+    <p:sldId id="265" r:id="rId11"/>
+    <p:sldId id="263" r:id="rId12"/>
+    <p:sldId id="264" r:id="rId13"/>
   </p:sldIdLst>
   <p:sldSz cx="12192000" cy="6858000"/>
   <p:notesSz cx="6858000" cy="9144000"/>
@@ -4003,6 +4005,381 @@
           <a:p>
             <a:r>
               <a:rPr lang="en-US" dirty="0" err="1"/>
+              <a:t>Ergebnisse</a:t>
+            </a:r>
+            <a:endParaRPr lang="en-US" dirty="0"/>
+          </a:p>
+        </p:txBody>
+      </p:sp>
+      <p:sp>
+        <p:nvSpPr>
+          <p:cNvPr id="3" name="Content Placeholder 2"/>
+          <p:cNvSpPr>
+            <a:spLocks noGrp="1"/>
+          </p:cNvSpPr>
+          <p:nvPr>
+            <p:ph idx="1"/>
+          </p:nvPr>
+        </p:nvSpPr>
+        <p:spPr>
+          <a:xfrm>
+            <a:off x="838200" y="1825625"/>
+            <a:ext cx="4321629" cy="4351338"/>
+          </a:xfrm>
+        </p:spPr>
+        <p:txBody>
+          <a:bodyPr/>
+          <a:lstStyle/>
+          <a:p>
+            <a:r>
+              <a:rPr lang="en-US" dirty="0"/>
+              <a:t>Prototype</a:t>
+            </a:r>
+          </a:p>
+          <a:p>
+            <a:pPr lvl="1"/>
+            <a:r>
+              <a:rPr lang="en-US" dirty="0"/>
+              <a:t>UI Screens: </a:t>
+            </a:r>
+            <a:r>
+              <a:rPr lang="en-US" dirty="0" err="1"/>
+              <a:t>Überweisung</a:t>
+            </a:r>
+            <a:r>
+              <a:rPr lang="en-US" dirty="0"/>
+              <a:t>, </a:t>
+            </a:r>
+            <a:r>
+              <a:rPr lang="en-US" dirty="0" err="1"/>
+              <a:t>Rezept</a:t>
+            </a:r>
+            <a:r>
+              <a:rPr lang="en-US" dirty="0"/>
+              <a:t> </a:t>
+            </a:r>
+            <a:r>
+              <a:rPr lang="en-US" dirty="0" err="1"/>
+              <a:t>ausstellen</a:t>
+            </a:r>
+            <a:endParaRPr lang="en-US" dirty="0"/>
+          </a:p>
+        </p:txBody>
+      </p:sp>
+      <p:pic>
+        <p:nvPicPr>
+          <p:cNvPr id="4" name="Picture 3"/>
+          <p:cNvPicPr>
+            <a:picLocks noChangeAspect="1"/>
+          </p:cNvPicPr>
+          <p:nvPr/>
+        </p:nvPicPr>
+        <p:blipFill>
+          <a:blip r:embed="rId2">
+            <a:extLst>
+              <a:ext uri="{28A0092B-C50C-407E-A947-70E740481C1C}">
+                <a14:useLocalDpi xmlns:a14="http://schemas.microsoft.com/office/drawing/2010/main" val="0"/>
+              </a:ext>
+            </a:extLst>
+          </a:blip>
+          <a:stretch>
+            <a:fillRect/>
+          </a:stretch>
+        </p:blipFill>
+        <p:spPr>
+          <a:xfrm>
+            <a:off x="8279147" y="542885"/>
+            <a:ext cx="3637617" cy="5189667"/>
+          </a:xfrm>
+          <a:prstGeom prst="rect">
+            <a:avLst/>
+          </a:prstGeom>
+        </p:spPr>
+      </p:pic>
+      <p:pic>
+        <p:nvPicPr>
+          <p:cNvPr id="5" name="Picture 4"/>
+          <p:cNvPicPr>
+            <a:picLocks noChangeAspect="1"/>
+          </p:cNvPicPr>
+          <p:nvPr/>
+        </p:nvPicPr>
+        <p:blipFill>
+          <a:blip r:embed="rId3">
+            <a:extLst>
+              <a:ext uri="{28A0092B-C50C-407E-A947-70E740481C1C}">
+                <a14:useLocalDpi xmlns:a14="http://schemas.microsoft.com/office/drawing/2010/main" val="0"/>
+              </a:ext>
+            </a:extLst>
+          </a:blip>
+          <a:stretch>
+            <a:fillRect/>
+          </a:stretch>
+        </p:blipFill>
+        <p:spPr>
+          <a:xfrm>
+            <a:off x="5159829" y="542886"/>
+            <a:ext cx="3042492" cy="5189667"/>
+          </a:xfrm>
+          <a:prstGeom prst="rect">
+            <a:avLst/>
+          </a:prstGeom>
+        </p:spPr>
+      </p:pic>
+    </p:spTree>
+    <p:extLst>
+      <p:ext uri="{BB962C8B-B14F-4D97-AF65-F5344CB8AC3E}">
+        <p14:creationId xmlns:p14="http://schemas.microsoft.com/office/powerpoint/2010/main" val="1139308908"/>
+      </p:ext>
+    </p:extLst>
+  </p:cSld>
+  <p:clrMapOvr>
+    <a:masterClrMapping/>
+  </p:clrMapOvr>
+</p:sld>
+</file>
+
+<file path=ppt/slides/slide11.xml><?xml version="1.0" encoding="utf-8"?>
+<p:sld xmlns:a="http://schemas.openxmlformats.org/drawingml/2006/main" xmlns:r="http://schemas.openxmlformats.org/officeDocument/2006/relationships" xmlns:p="http://schemas.openxmlformats.org/presentationml/2006/main">
+  <p:cSld>
+    <p:spTree>
+      <p:nvGrpSpPr>
+        <p:cNvPr id="1" name=""/>
+        <p:cNvGrpSpPr/>
+        <p:nvPr/>
+      </p:nvGrpSpPr>
+      <p:grpSpPr>
+        <a:xfrm>
+          <a:off x="0" y="0"/>
+          <a:ext cx="0" cy="0"/>
+          <a:chOff x="0" y="0"/>
+          <a:chExt cx="0" cy="0"/>
+        </a:xfrm>
+      </p:grpSpPr>
+      <p:sp>
+        <p:nvSpPr>
+          <p:cNvPr id="2" name="Title 1"/>
+          <p:cNvSpPr>
+            <a:spLocks noGrp="1"/>
+          </p:cNvSpPr>
+          <p:nvPr>
+            <p:ph type="title"/>
+          </p:nvPr>
+        </p:nvSpPr>
+        <p:spPr/>
+        <p:txBody>
+          <a:bodyPr/>
+          <a:lstStyle/>
+          <a:p>
+            <a:r>
+              <a:rPr lang="en-US" dirty="0" err="1"/>
+              <a:t>Ergebnisse</a:t>
+            </a:r>
+            <a:endParaRPr lang="en-US" dirty="0"/>
+          </a:p>
+        </p:txBody>
+      </p:sp>
+      <p:sp>
+        <p:nvSpPr>
+          <p:cNvPr id="3" name="Content Placeholder 2"/>
+          <p:cNvSpPr>
+            <a:spLocks noGrp="1"/>
+          </p:cNvSpPr>
+          <p:nvPr>
+            <p:ph idx="1"/>
+          </p:nvPr>
+        </p:nvSpPr>
+        <p:spPr>
+          <a:xfrm>
+            <a:off x="838200" y="1825625"/>
+            <a:ext cx="2906027" cy="4351338"/>
+          </a:xfrm>
+        </p:spPr>
+        <p:txBody>
+          <a:bodyPr/>
+          <a:lstStyle/>
+          <a:p>
+            <a:r>
+              <a:rPr lang="en-US" dirty="0"/>
+              <a:t>Prototype</a:t>
+            </a:r>
+          </a:p>
+          <a:p>
+            <a:pPr lvl="1"/>
+            <a:r>
+              <a:rPr lang="en-US" dirty="0"/>
+              <a:t>UI Linking:</a:t>
+            </a:r>
+          </a:p>
+          <a:p>
+            <a:pPr marL="457200" lvl="1" indent="0">
+              <a:buNone/>
+            </a:pPr>
+            <a:endParaRPr lang="en-US" dirty="0"/>
+          </a:p>
+          <a:p>
+            <a:pPr marL="457200" lvl="1" indent="0">
+              <a:buNone/>
+            </a:pPr>
+            <a:endParaRPr lang="en-US" dirty="0"/>
+          </a:p>
+          <a:p>
+            <a:pPr marL="457200" lvl="1" indent="0">
+              <a:buNone/>
+            </a:pPr>
+            <a:endParaRPr lang="en-US" sz="1600" dirty="0"/>
+          </a:p>
+          <a:p>
+            <a:pPr marL="457200" lvl="1" indent="0">
+              <a:buNone/>
+            </a:pPr>
+            <a:endParaRPr lang="en-US" sz="1600" dirty="0"/>
+          </a:p>
+          <a:p>
+            <a:pPr marL="457200" lvl="1" indent="0">
+              <a:buNone/>
+            </a:pPr>
+            <a:endParaRPr lang="en-US" sz="1600" dirty="0"/>
+          </a:p>
+          <a:p>
+            <a:pPr marL="457200" lvl="1" indent="0">
+              <a:buNone/>
+            </a:pPr>
+            <a:endParaRPr lang="en-US" sz="1600" dirty="0"/>
+          </a:p>
+          <a:p>
+            <a:pPr marL="457200" lvl="1" indent="0">
+              <a:buNone/>
+            </a:pPr>
+            <a:endParaRPr lang="en-US" sz="1600" dirty="0"/>
+          </a:p>
+          <a:p>
+            <a:pPr marL="457200" lvl="1" indent="0">
+              <a:buNone/>
+            </a:pPr>
+            <a:r>
+              <a:rPr lang="en-US" sz="1600" dirty="0"/>
+              <a:t>E.g.: Create Appt.: </a:t>
+            </a:r>
+          </a:p>
+          <a:p>
+            <a:pPr lvl="1">
+              <a:buFontTx/>
+              <a:buChar char="-"/>
+            </a:pPr>
+            <a:r>
+              <a:rPr lang="en-US" sz="1600" dirty="0"/>
+              <a:t>New Appt.&gt;Patient Search&gt;Timetable&gt;Confirm</a:t>
+            </a:r>
+          </a:p>
+          <a:p>
+            <a:pPr lvl="1">
+              <a:buFontTx/>
+              <a:buChar char="-"/>
+            </a:pPr>
+            <a:endParaRPr lang="en-US" sz="1600" dirty="0"/>
+          </a:p>
+          <a:p>
+            <a:pPr lvl="1"/>
+            <a:endParaRPr lang="en-US" dirty="0"/>
+          </a:p>
+        </p:txBody>
+      </p:sp>
+      <p:pic>
+        <p:nvPicPr>
+          <p:cNvPr id="4" name="Picture 3"/>
+          <p:cNvPicPr>
+            <a:picLocks noChangeAspect="1"/>
+          </p:cNvPicPr>
+          <p:nvPr/>
+        </p:nvPicPr>
+        <p:blipFill>
+          <a:blip r:embed="rId2"/>
+          <a:stretch>
+            <a:fillRect/>
+          </a:stretch>
+        </p:blipFill>
+        <p:spPr>
+          <a:xfrm>
+            <a:off x="4002942" y="898845"/>
+            <a:ext cx="7350858" cy="2700215"/>
+          </a:xfrm>
+          <a:prstGeom prst="rect">
+            <a:avLst/>
+          </a:prstGeom>
+        </p:spPr>
+      </p:pic>
+      <p:pic>
+        <p:nvPicPr>
+          <p:cNvPr id="6" name="Picture 5"/>
+          <p:cNvPicPr>
+            <a:picLocks noChangeAspect="1"/>
+          </p:cNvPicPr>
+          <p:nvPr/>
+        </p:nvPicPr>
+        <p:blipFill>
+          <a:blip r:embed="rId3"/>
+          <a:stretch>
+            <a:fillRect/>
+          </a:stretch>
+        </p:blipFill>
+        <p:spPr>
+          <a:xfrm>
+            <a:off x="3848137" y="4223689"/>
+            <a:ext cx="7505663" cy="1508638"/>
+          </a:xfrm>
+          <a:prstGeom prst="rect">
+            <a:avLst/>
+          </a:prstGeom>
+        </p:spPr>
+      </p:pic>
+    </p:spTree>
+    <p:extLst>
+      <p:ext uri="{BB962C8B-B14F-4D97-AF65-F5344CB8AC3E}">
+        <p14:creationId xmlns:p14="http://schemas.microsoft.com/office/powerpoint/2010/main" val="3097029800"/>
+      </p:ext>
+    </p:extLst>
+  </p:cSld>
+  <p:clrMapOvr>
+    <a:masterClrMapping/>
+  </p:clrMapOvr>
+</p:sld>
+</file>
+
+<file path=ppt/slides/slide12.xml><?xml version="1.0" encoding="utf-8"?>
+<p:sld xmlns:a="http://schemas.openxmlformats.org/drawingml/2006/main" xmlns:r="http://schemas.openxmlformats.org/officeDocument/2006/relationships" xmlns:p="http://schemas.openxmlformats.org/presentationml/2006/main">
+  <p:cSld>
+    <p:spTree>
+      <p:nvGrpSpPr>
+        <p:cNvPr id="1" name=""/>
+        <p:cNvGrpSpPr/>
+        <p:nvPr/>
+      </p:nvGrpSpPr>
+      <p:grpSpPr>
+        <a:xfrm>
+          <a:off x="0" y="0"/>
+          <a:ext cx="0" cy="0"/>
+          <a:chOff x="0" y="0"/>
+          <a:chExt cx="0" cy="0"/>
+        </a:xfrm>
+      </p:grpSpPr>
+      <p:sp>
+        <p:nvSpPr>
+          <p:cNvPr id="2" name="Title 1"/>
+          <p:cNvSpPr>
+            <a:spLocks noGrp="1"/>
+          </p:cNvSpPr>
+          <p:nvPr>
+            <p:ph type="title"/>
+          </p:nvPr>
+        </p:nvSpPr>
+        <p:spPr/>
+        <p:txBody>
+          <a:bodyPr/>
+          <a:lstStyle/>
+          <a:p>
+            <a:r>
+              <a:rPr lang="en-US" dirty="0" err="1"/>
               <a:t>Fazit</a:t>
             </a:r>
             <a:endParaRPr lang="en-US" dirty="0"/>
@@ -4042,17 +4419,11 @@
           <a:p>
             <a:r>
               <a:rPr lang="de-CH" dirty="0"/>
-              <a:t>Erster Prototyp kann implementiert werden</a:t>
-            </a:r>
-          </a:p>
-          <a:p>
-            <a:r>
-              <a:rPr lang="de-CH">
-                <a:highlight>
-                  <a:srgbClr val="FFFF00"/>
-                </a:highlight>
-              </a:rPr>
-              <a:t>TODO..?</a:t>
+              <a:t>Erster Prototyp kann </a:t>
+            </a:r>
+            <a:r>
+              <a:rPr lang="de-CH"/>
+              <a:t>implementiert werden</a:t>
             </a:r>
             <a:endParaRPr lang="de-CH" dirty="0">
               <a:highlight>
@@ -5120,7 +5491,7 @@
               <a:rPr lang="en-US" dirty="0" err="1"/>
               <a:t>Ergebnisse</a:t>
             </a:r>
-            <a:endParaRPr lang="en-US" dirty="0"/>
+            <a:endParaRPr lang="de-CH" dirty="0"/>
           </a:p>
         </p:txBody>
       </p:sp>
@@ -5148,48 +5519,75 @@
             <a:pPr lvl="1"/>
             <a:r>
               <a:rPr lang="en-US" dirty="0"/>
-              <a:t>UI Screens</a:t>
-            </a:r>
-          </a:p>
-          <a:p>
-            <a:pPr lvl="1"/>
-            <a:endParaRPr lang="en-US" dirty="0"/>
-          </a:p>
-          <a:p>
-            <a:pPr marL="457200" lvl="1" indent="0">
-              <a:buNone/>
-            </a:pPr>
-            <a:r>
-              <a:rPr lang="en-US" dirty="0">
-                <a:highlight>
-                  <a:srgbClr val="FFFF00"/>
-                </a:highlight>
-              </a:rPr>
-              <a:t>TODO: Scans </a:t>
-            </a:r>
-            <a:r>
-              <a:rPr lang="en-US" dirty="0" err="1">
-                <a:highlight>
-                  <a:srgbClr val="FFFF00"/>
-                </a:highlight>
-              </a:rPr>
-              <a:t>folgen</a:t>
-            </a:r>
-            <a:r>
-              <a:rPr lang="en-US" dirty="0">
-                <a:highlight>
-                  <a:srgbClr val="FFFF00"/>
-                </a:highlight>
-              </a:rPr>
-              <a:t>…</a:t>
-            </a:r>
-          </a:p>
-        </p:txBody>
-      </p:sp>
+              <a:t>UI Screens: Timetable</a:t>
+            </a:r>
+          </a:p>
+        </p:txBody>
+      </p:sp>
+      <p:pic>
+        <p:nvPicPr>
+          <p:cNvPr id="4" name="Picture 3"/>
+          <p:cNvPicPr>
+            <a:picLocks noChangeAspect="1"/>
+          </p:cNvPicPr>
+          <p:nvPr/>
+        </p:nvPicPr>
+        <p:blipFill>
+          <a:blip r:embed="rId2">
+            <a:extLst>
+              <a:ext uri="{28A0092B-C50C-407E-A947-70E740481C1C}">
+                <a14:useLocalDpi xmlns:a14="http://schemas.microsoft.com/office/drawing/2010/main" val="0"/>
+              </a:ext>
+            </a:extLst>
+          </a:blip>
+          <a:stretch>
+            <a:fillRect/>
+          </a:stretch>
+        </p:blipFill>
+        <p:spPr>
+          <a:xfrm>
+            <a:off x="5149503" y="608391"/>
+            <a:ext cx="2814317" cy="5568572"/>
+          </a:xfrm>
+          <a:prstGeom prst="rect">
+            <a:avLst/>
+          </a:prstGeom>
+        </p:spPr>
+      </p:pic>
+      <p:pic>
+        <p:nvPicPr>
+          <p:cNvPr id="5" name="Picture 4"/>
+          <p:cNvPicPr>
+            <a:picLocks noChangeAspect="1"/>
+          </p:cNvPicPr>
+          <p:nvPr/>
+        </p:nvPicPr>
+        <p:blipFill>
+          <a:blip r:embed="rId3">
+            <a:extLst>
+              <a:ext uri="{28A0092B-C50C-407E-A947-70E740481C1C}">
+                <a14:useLocalDpi xmlns:a14="http://schemas.microsoft.com/office/drawing/2010/main" val="0"/>
+              </a:ext>
+            </a:extLst>
+          </a:blip>
+          <a:stretch>
+            <a:fillRect/>
+          </a:stretch>
+        </p:blipFill>
+        <p:spPr>
+          <a:xfrm>
+            <a:off x="8442091" y="608391"/>
+            <a:ext cx="2659988" cy="5568572"/>
+          </a:xfrm>
+          <a:prstGeom prst="rect">
+            <a:avLst/>
+          </a:prstGeom>
+        </p:spPr>
+      </p:pic>
     </p:spTree>
     <p:extLst>
       <p:ext uri="{BB962C8B-B14F-4D97-AF65-F5344CB8AC3E}">
-        <p14:creationId xmlns:p14="http://schemas.microsoft.com/office/powerpoint/2010/main" val="1139308908"/>
+        <p14:creationId xmlns:p14="http://schemas.microsoft.com/office/powerpoint/2010/main" val="3633917910"/>
       </p:ext>
     </p:extLst>
   </p:cSld>
@@ -5232,10 +5630,9 @@
           <a:lstStyle/>
           <a:p>
             <a:r>
-              <a:rPr lang="en-US" dirty="0" err="1"/>
+              <a:rPr lang="de-CH" dirty="0"/>
               <a:t>Ergebnisse</a:t>
             </a:r>
-            <a:endParaRPr lang="en-US" dirty="0"/>
           </a:p>
         </p:txBody>
       </p:sp>
@@ -5249,99 +5646,15 @@
             <p:ph idx="1"/>
           </p:nvPr>
         </p:nvSpPr>
-        <p:spPr>
-          <a:xfrm>
-            <a:off x="838200" y="1825625"/>
-            <a:ext cx="2906027" cy="4351338"/>
-          </a:xfrm>
-        </p:spPr>
-        <p:txBody>
-          <a:bodyPr/>
-          <a:lstStyle/>
-          <a:p>
-            <a:r>
-              <a:rPr lang="en-US" dirty="0"/>
-              <a:t>Prototype</a:t>
-            </a:r>
-          </a:p>
-          <a:p>
-            <a:pPr lvl="1"/>
-            <a:r>
-              <a:rPr lang="en-US" dirty="0"/>
-              <a:t>UI Linking:</a:t>
-            </a:r>
-          </a:p>
-          <a:p>
-            <a:pPr marL="457200" lvl="1" indent="0">
-              <a:buNone/>
-            </a:pPr>
-            <a:endParaRPr lang="en-US" dirty="0"/>
-          </a:p>
-          <a:p>
-            <a:pPr marL="457200" lvl="1" indent="0">
-              <a:buNone/>
-            </a:pPr>
-            <a:endParaRPr lang="en-US" dirty="0"/>
-          </a:p>
-          <a:p>
-            <a:pPr marL="457200" lvl="1" indent="0">
-              <a:buNone/>
-            </a:pPr>
-            <a:endParaRPr lang="en-US" sz="1600" dirty="0"/>
-          </a:p>
-          <a:p>
-            <a:pPr marL="457200" lvl="1" indent="0">
-              <a:buNone/>
-            </a:pPr>
-            <a:endParaRPr lang="en-US" sz="1600" dirty="0"/>
-          </a:p>
-          <a:p>
-            <a:pPr marL="457200" lvl="1" indent="0">
-              <a:buNone/>
-            </a:pPr>
-            <a:endParaRPr lang="en-US" sz="1600" dirty="0"/>
-          </a:p>
-          <a:p>
-            <a:pPr marL="457200" lvl="1" indent="0">
-              <a:buNone/>
-            </a:pPr>
-            <a:endParaRPr lang="en-US" sz="1600" dirty="0"/>
-          </a:p>
-          <a:p>
-            <a:pPr marL="457200" lvl="1" indent="0">
-              <a:buNone/>
-            </a:pPr>
-            <a:endParaRPr lang="en-US" sz="1600" dirty="0"/>
-          </a:p>
-          <a:p>
-            <a:pPr marL="457200" lvl="1" indent="0">
-              <a:buNone/>
-            </a:pPr>
-            <a:r>
-              <a:rPr lang="en-US" sz="1600" dirty="0"/>
-              <a:t>E.g.: Create Appt.: </a:t>
-            </a:r>
-          </a:p>
-          <a:p>
-            <a:pPr lvl="1">
-              <a:buFontTx/>
-              <a:buChar char="-"/>
-            </a:pPr>
-            <a:r>
-              <a:rPr lang="en-US" sz="1600" dirty="0"/>
-              <a:t>New Appt.&gt;Patient Search&gt;Timetable&gt;Confirm</a:t>
-            </a:r>
-          </a:p>
-          <a:p>
-            <a:pPr lvl="1">
-              <a:buFontTx/>
-              <a:buChar char="-"/>
-            </a:pPr>
-            <a:endParaRPr lang="en-US" sz="1600" dirty="0"/>
-          </a:p>
-          <a:p>
-            <a:pPr lvl="1"/>
-            <a:endParaRPr lang="en-US" dirty="0"/>
+        <p:spPr/>
+        <p:txBody>
+          <a:bodyPr/>
+          <a:lstStyle/>
+          <a:p>
+            <a:r>
+              <a:rPr lang="de-CH" dirty="0"/>
+              <a:t>UI Screens: Patientensuche und -Ansicht</a:t>
+            </a:r>
           </a:p>
         </p:txBody>
       </p:sp>
@@ -5354,39 +5667,21 @@
           <p:nvPr/>
         </p:nvPicPr>
         <p:blipFill>
-          <a:blip r:embed="rId2"/>
+          <a:blip r:embed="rId2">
+            <a:extLst>
+              <a:ext uri="{28A0092B-C50C-407E-A947-70E740481C1C}">
+                <a14:useLocalDpi xmlns:a14="http://schemas.microsoft.com/office/drawing/2010/main" val="0"/>
+              </a:ext>
+            </a:extLst>
+          </a:blip>
           <a:stretch>
             <a:fillRect/>
           </a:stretch>
         </p:blipFill>
         <p:spPr>
           <a:xfrm>
-            <a:off x="4002942" y="898845"/>
-            <a:ext cx="7350858" cy="2700215"/>
-          </a:xfrm>
-          <a:prstGeom prst="rect">
-            <a:avLst/>
-          </a:prstGeom>
-        </p:spPr>
-      </p:pic>
-      <p:pic>
-        <p:nvPicPr>
-          <p:cNvPr id="6" name="Picture 5"/>
-          <p:cNvPicPr>
-            <a:picLocks noChangeAspect="1"/>
-          </p:cNvPicPr>
-          <p:nvPr/>
-        </p:nvPicPr>
-        <p:blipFill>
-          <a:blip r:embed="rId3"/>
-          <a:stretch>
-            <a:fillRect/>
-          </a:stretch>
-        </p:blipFill>
-        <p:spPr>
-          <a:xfrm>
-            <a:off x="3848137" y="4223689"/>
-            <a:ext cx="7505663" cy="1508638"/>
+            <a:off x="2757888" y="2328952"/>
+            <a:ext cx="6676223" cy="4444051"/>
           </a:xfrm>
           <a:prstGeom prst="rect">
             <a:avLst/>
@@ -5396,7 +5691,7 @@
     </p:spTree>
     <p:extLst>
       <p:ext uri="{BB962C8B-B14F-4D97-AF65-F5344CB8AC3E}">
-        <p14:creationId xmlns:p14="http://schemas.microsoft.com/office/powerpoint/2010/main" val="3097029800"/>
+        <p14:creationId xmlns:p14="http://schemas.microsoft.com/office/powerpoint/2010/main" val="766434722"/>
       </p:ext>
     </p:extLst>
   </p:cSld>

</xml_diff>